<commit_message>
docs: updates to oo presentation
</commit_message>
<xml_diff>
--- a/presentations/oop/presentation.pptx
+++ b/presentations/oop/presentation.pptx
@@ -131,6 +131,35 @@
 </p1510:revInfo>
 </file>
 
+<file path=ppt/changesInfos/changesInfo1.xml><?xml version="1.0" encoding="utf-8"?>
+<pc:chgInfo xmlns:a="http://schemas.openxmlformats.org/drawingml/2006/main" xmlns:r="http://schemas.openxmlformats.org/officeDocument/2006/relationships" xmlns:ac="http://schemas.microsoft.com/office/drawing/2013/main/command" xmlns:pc="http://schemas.microsoft.com/office/powerpoint/2013/main/command">
+  <pc:docChgLst>
+    <pc:chgData name="Sean Young" userId="f7341a7556fd45c4" providerId="LiveId" clId="{00D8E413-2CAB-4B97-AD50-D1CE4C8D651C}"/>
+    <pc:docChg chg="modSld">
+      <pc:chgData name="Sean Young" userId="f7341a7556fd45c4" providerId="LiveId" clId="{00D8E413-2CAB-4B97-AD50-D1CE4C8D651C}" dt="2021-06-17T17:55:18.374" v="2" actId="20577"/>
+      <pc:docMkLst>
+        <pc:docMk/>
+      </pc:docMkLst>
+      <pc:sldChg chg="modSp mod">
+        <pc:chgData name="Sean Young" userId="f7341a7556fd45c4" providerId="LiveId" clId="{00D8E413-2CAB-4B97-AD50-D1CE4C8D651C}" dt="2021-06-17T17:55:18.374" v="2" actId="20577"/>
+        <pc:sldMkLst>
+          <pc:docMk/>
+          <pc:sldMk cId="3255247148" sldId="256"/>
+        </pc:sldMkLst>
+        <pc:spChg chg="mod">
+          <ac:chgData name="Sean Young" userId="f7341a7556fd45c4" providerId="LiveId" clId="{00D8E413-2CAB-4B97-AD50-D1CE4C8D651C}" dt="2021-06-17T17:55:18.374" v="2" actId="20577"/>
+          <ac:spMkLst>
+            <pc:docMk/>
+            <pc:sldMk cId="3255247148" sldId="256"/>
+            <ac:spMk id="3" creationId="{E3D62C0E-63DE-4B05-8A5B-4168D2FB069F}"/>
+          </ac:spMkLst>
+        </pc:spChg>
+      </pc:sldChg>
+    </pc:docChg>
+  </pc:docChgLst>
+</pc:chgInfo>
+</file>
+
 <file path=ppt/slideLayouts/slideLayout1.xml><?xml version="1.0" encoding="utf-8"?>
 <p:sldLayout xmlns:a="http://schemas.openxmlformats.org/drawingml/2006/main" xmlns:r="http://schemas.openxmlformats.org/officeDocument/2006/relationships" xmlns:p="http://schemas.openxmlformats.org/presentationml/2006/main" showMasterSp="0" type="title" preserve="1">
   <p:cSld name="Title Slide">
@@ -181,7 +210,7 @@
           <a:noFill/>
           <a:extLst>
             <a:ext uri="{909E8E84-426E-40dd-AFC4-6F175D3DCCD1}">
-              <a14:hiddenFill xmlns:a14="http://schemas.microsoft.com/office/drawing/2010/main" xmlns="">
+              <a14:hiddenFill xmlns="" xmlns:a14="http://schemas.microsoft.com/office/drawing/2010/main">
                 <a:solidFill>
                   <a:srgbClr val="FFFFFF"/>
                 </a:solidFill>
@@ -241,7 +270,7 @@
             </a:ln>
             <a:extLst>
               <a:ext uri="{91240B29-F687-4f45-9708-019B960494DF}">
-                <a14:hiddenLine xmlns:a14="http://schemas.microsoft.com/office/drawing/2010/main" xmlns="" w="9525">
+                <a14:hiddenLine xmlns="" xmlns:a14="http://schemas.microsoft.com/office/drawing/2010/main" w="9525">
                   <a:solidFill>
                     <a:srgbClr val="000000"/>
                   </a:solidFill>
@@ -331,7 +360,7 @@
             </a:ln>
             <a:extLst>
               <a:ext uri="{91240B29-F687-4f45-9708-019B960494DF}">
-                <a14:hiddenLine xmlns:a14="http://schemas.microsoft.com/office/drawing/2010/main" xmlns="" w="9525">
+                <a14:hiddenLine xmlns="" xmlns:a14="http://schemas.microsoft.com/office/drawing/2010/main" w="9525">
                   <a:solidFill>
                     <a:srgbClr val="000000"/>
                   </a:solidFill>
@@ -421,7 +450,7 @@
             </a:ln>
             <a:extLst>
               <a:ext uri="{91240B29-F687-4f45-9708-019B960494DF}">
-                <a14:hiddenLine xmlns:a14="http://schemas.microsoft.com/office/drawing/2010/main" xmlns="" w="9525">
+                <a14:hiddenLine xmlns="" xmlns:a14="http://schemas.microsoft.com/office/drawing/2010/main" w="9525">
                   <a:solidFill>
                     <a:srgbClr val="000000"/>
                   </a:solidFill>
@@ -455,7 +484,7 @@
             </a:ln>
             <a:extLst>
               <a:ext uri="{91240B29-F687-4f45-9708-019B960494DF}">
-                <a14:hiddenLine xmlns:a14="http://schemas.microsoft.com/office/drawing/2010/main" xmlns="" w="9525">
+                <a14:hiddenLine xmlns="" xmlns:a14="http://schemas.microsoft.com/office/drawing/2010/main" w="9525">
                   <a:solidFill>
                     <a:srgbClr val="000000"/>
                   </a:solidFill>
@@ -545,7 +574,7 @@
             </a:ln>
             <a:extLst>
               <a:ext uri="{91240B29-F687-4f45-9708-019B960494DF}">
-                <a14:hiddenLine xmlns:a14="http://schemas.microsoft.com/office/drawing/2010/main" xmlns="" w="9525">
+                <a14:hiddenLine xmlns="" xmlns:a14="http://schemas.microsoft.com/office/drawing/2010/main" w="9525">
                   <a:solidFill>
                     <a:srgbClr val="000000"/>
                   </a:solidFill>
@@ -607,7 +636,7 @@
             </a:ln>
             <a:extLst>
               <a:ext uri="{91240B29-F687-4f45-9708-019B960494DF}">
-                <a14:hiddenLine xmlns:a14="http://schemas.microsoft.com/office/drawing/2010/main" xmlns="" w="9525">
+                <a14:hiddenLine xmlns="" xmlns:a14="http://schemas.microsoft.com/office/drawing/2010/main" w="9525">
                   <a:solidFill>
                     <a:srgbClr val="000000"/>
                   </a:solidFill>
@@ -669,7 +698,7 @@
             </a:ln>
             <a:extLst>
               <a:ext uri="{91240B29-F687-4f45-9708-019B960494DF}">
-                <a14:hiddenLine xmlns:a14="http://schemas.microsoft.com/office/drawing/2010/main" xmlns="" w="9525">
+                <a14:hiddenLine xmlns="" xmlns:a14="http://schemas.microsoft.com/office/drawing/2010/main" w="9525">
                   <a:solidFill>
                     <a:srgbClr val="000000"/>
                   </a:solidFill>
@@ -759,7 +788,7 @@
             </a:ln>
             <a:extLst>
               <a:ext uri="{91240B29-F687-4f45-9708-019B960494DF}">
-                <a14:hiddenLine xmlns:a14="http://schemas.microsoft.com/office/drawing/2010/main" xmlns="" w="9525">
+                <a14:hiddenLine xmlns="" xmlns:a14="http://schemas.microsoft.com/office/drawing/2010/main" w="9525">
                   <a:solidFill>
                     <a:srgbClr val="000000"/>
                   </a:solidFill>
@@ -821,7 +850,7 @@
             </a:ln>
             <a:extLst>
               <a:ext uri="{91240B29-F687-4f45-9708-019B960494DF}">
-                <a14:hiddenLine xmlns:a14="http://schemas.microsoft.com/office/drawing/2010/main" xmlns="" w="9525">
+                <a14:hiddenLine xmlns="" xmlns:a14="http://schemas.microsoft.com/office/drawing/2010/main" w="9525">
                   <a:solidFill>
                     <a:srgbClr val="000000"/>
                   </a:solidFill>
@@ -883,7 +912,7 @@
             </a:ln>
             <a:extLst>
               <a:ext uri="{91240B29-F687-4f45-9708-019B960494DF}">
-                <a14:hiddenLine xmlns:a14="http://schemas.microsoft.com/office/drawing/2010/main" xmlns="" w="9525">
+                <a14:hiddenLine xmlns="" xmlns:a14="http://schemas.microsoft.com/office/drawing/2010/main" w="9525">
                   <a:solidFill>
                     <a:srgbClr val="000000"/>
                   </a:solidFill>
@@ -973,7 +1002,7 @@
             </a:ln>
             <a:extLst>
               <a:ext uri="{91240B29-F687-4f45-9708-019B960494DF}">
-                <a14:hiddenLine xmlns:a14="http://schemas.microsoft.com/office/drawing/2010/main" xmlns="" w="9525">
+                <a14:hiddenLine xmlns="" xmlns:a14="http://schemas.microsoft.com/office/drawing/2010/main" w="9525">
                   <a:solidFill>
                     <a:srgbClr val="000000"/>
                   </a:solidFill>
@@ -1063,7 +1092,7 @@
             </a:ln>
             <a:extLst>
               <a:ext uri="{91240B29-F687-4f45-9708-019B960494DF}">
-                <a14:hiddenLine xmlns:a14="http://schemas.microsoft.com/office/drawing/2010/main" xmlns="" w="9525">
+                <a14:hiddenLine xmlns="" xmlns:a14="http://schemas.microsoft.com/office/drawing/2010/main" w="9525">
                   <a:solidFill>
                     <a:srgbClr val="000000"/>
                   </a:solidFill>
@@ -1125,7 +1154,7 @@
             </a:ln>
             <a:extLst>
               <a:ext uri="{91240B29-F687-4f45-9708-019B960494DF}">
-                <a14:hiddenLine xmlns:a14="http://schemas.microsoft.com/office/drawing/2010/main" xmlns="" w="9525">
+                <a14:hiddenLine xmlns="" xmlns:a14="http://schemas.microsoft.com/office/drawing/2010/main" w="9525">
                   <a:solidFill>
                     <a:srgbClr val="000000"/>
                   </a:solidFill>
@@ -1235,7 +1264,7 @@
             </a:ln>
             <a:extLst>
               <a:ext uri="{91240B29-F687-4f45-9708-019B960494DF}">
-                <a14:hiddenLine xmlns:a14="http://schemas.microsoft.com/office/drawing/2010/main" xmlns="" w="9525">
+                <a14:hiddenLine xmlns="" xmlns:a14="http://schemas.microsoft.com/office/drawing/2010/main" w="9525">
                   <a:solidFill>
                     <a:srgbClr val="000000"/>
                   </a:solidFill>
@@ -1297,7 +1326,7 @@
             </a:ln>
             <a:extLst>
               <a:ext uri="{91240B29-F687-4f45-9708-019B960494DF}">
-                <a14:hiddenLine xmlns:a14="http://schemas.microsoft.com/office/drawing/2010/main" xmlns="" w="9525">
+                <a14:hiddenLine xmlns="" xmlns:a14="http://schemas.microsoft.com/office/drawing/2010/main" w="9525">
                   <a:solidFill>
                     <a:srgbClr val="000000"/>
                   </a:solidFill>
@@ -1387,7 +1416,7 @@
             </a:ln>
             <a:extLst>
               <a:ext uri="{91240B29-F687-4f45-9708-019B960494DF}">
-                <a14:hiddenLine xmlns:a14="http://schemas.microsoft.com/office/drawing/2010/main" xmlns="" w="9525">
+                <a14:hiddenLine xmlns="" xmlns:a14="http://schemas.microsoft.com/office/drawing/2010/main" w="9525">
                   <a:solidFill>
                     <a:srgbClr val="000000"/>
                   </a:solidFill>
@@ -1477,7 +1506,7 @@
             </a:ln>
             <a:extLst>
               <a:ext uri="{91240B29-F687-4f45-9708-019B960494DF}">
-                <a14:hiddenLine xmlns:a14="http://schemas.microsoft.com/office/drawing/2010/main" xmlns="" w="9525">
+                <a14:hiddenLine xmlns="" xmlns:a14="http://schemas.microsoft.com/office/drawing/2010/main" w="9525">
                   <a:solidFill>
                     <a:srgbClr val="000000"/>
                   </a:solidFill>
@@ -1539,7 +1568,7 @@
             </a:ln>
             <a:extLst>
               <a:ext uri="{91240B29-F687-4f45-9708-019B960494DF}">
-                <a14:hiddenLine xmlns:a14="http://schemas.microsoft.com/office/drawing/2010/main" xmlns="" w="9525">
+                <a14:hiddenLine xmlns="" xmlns:a14="http://schemas.microsoft.com/office/drawing/2010/main" w="9525">
                   <a:solidFill>
                     <a:srgbClr val="000000"/>
                   </a:solidFill>
@@ -1629,7 +1658,7 @@
             </a:ln>
             <a:extLst>
               <a:ext uri="{91240B29-F687-4f45-9708-019B960494DF}">
-                <a14:hiddenLine xmlns:a14="http://schemas.microsoft.com/office/drawing/2010/main" xmlns="" w="9525">
+                <a14:hiddenLine xmlns="" xmlns:a14="http://schemas.microsoft.com/office/drawing/2010/main" w="9525">
                   <a:solidFill>
                     <a:srgbClr val="000000"/>
                   </a:solidFill>
@@ -1719,7 +1748,7 @@
             </a:ln>
             <a:extLst>
               <a:ext uri="{91240B29-F687-4f45-9708-019B960494DF}">
-                <a14:hiddenLine xmlns:a14="http://schemas.microsoft.com/office/drawing/2010/main" xmlns="" w="9525">
+                <a14:hiddenLine xmlns="" xmlns:a14="http://schemas.microsoft.com/office/drawing/2010/main" w="9525">
                   <a:solidFill>
                     <a:srgbClr val="000000"/>
                   </a:solidFill>
@@ -1775,7 +1804,7 @@
             </a:ln>
             <a:extLst>
               <a:ext uri="{91240B29-F687-4f45-9708-019B960494DF}">
-                <a14:hiddenLine xmlns:a14="http://schemas.microsoft.com/office/drawing/2010/main" xmlns="" w="9525">
+                <a14:hiddenLine xmlns="" xmlns:a14="http://schemas.microsoft.com/office/drawing/2010/main" w="9525">
                   <a:solidFill>
                     <a:srgbClr val="000000"/>
                   </a:solidFill>
@@ -1865,7 +1894,7 @@
             </a:ln>
             <a:extLst>
               <a:ext uri="{91240B29-F687-4f45-9708-019B960494DF}">
-                <a14:hiddenLine xmlns:a14="http://schemas.microsoft.com/office/drawing/2010/main" xmlns="" w="9525">
+                <a14:hiddenLine xmlns="" xmlns:a14="http://schemas.microsoft.com/office/drawing/2010/main" w="9525">
                   <a:solidFill>
                     <a:srgbClr val="000000"/>
                   </a:solidFill>
@@ -1921,7 +1950,7 @@
             </a:ln>
             <a:extLst>
               <a:ext uri="{91240B29-F687-4f45-9708-019B960494DF}">
-                <a14:hiddenLine xmlns:a14="http://schemas.microsoft.com/office/drawing/2010/main" xmlns="" w="9525">
+                <a14:hiddenLine xmlns="" xmlns:a14="http://schemas.microsoft.com/office/drawing/2010/main" w="9525">
                   <a:solidFill>
                     <a:srgbClr val="000000"/>
                   </a:solidFill>
@@ -2011,7 +2040,7 @@
             </a:ln>
             <a:extLst>
               <a:ext uri="{91240B29-F687-4f45-9708-019B960494DF}">
-                <a14:hiddenLine xmlns:a14="http://schemas.microsoft.com/office/drawing/2010/main" xmlns="" w="9525">
+                <a14:hiddenLine xmlns="" xmlns:a14="http://schemas.microsoft.com/office/drawing/2010/main" w="9525">
                   <a:solidFill>
                     <a:srgbClr val="000000"/>
                   </a:solidFill>
@@ -2079,7 +2108,7 @@
             </a:ln>
             <a:extLst>
               <a:ext uri="{91240B29-F687-4f45-9708-019B960494DF}">
-                <a14:hiddenLine xmlns:a14="http://schemas.microsoft.com/office/drawing/2010/main" xmlns="" w="9525">
+                <a14:hiddenLine xmlns="" xmlns:a14="http://schemas.microsoft.com/office/drawing/2010/main" w="9525">
                   <a:solidFill>
                     <a:srgbClr val="000000"/>
                   </a:solidFill>
@@ -2169,7 +2198,7 @@
             </a:ln>
             <a:extLst>
               <a:ext uri="{91240B29-F687-4f45-9708-019B960494DF}">
-                <a14:hiddenLine xmlns:a14="http://schemas.microsoft.com/office/drawing/2010/main" xmlns="" w="9525">
+                <a14:hiddenLine xmlns="" xmlns:a14="http://schemas.microsoft.com/office/drawing/2010/main" w="9525">
                   <a:solidFill>
                     <a:srgbClr val="000000"/>
                   </a:solidFill>
@@ -2237,7 +2266,7 @@
             </a:ln>
             <a:extLst>
               <a:ext uri="{91240B29-F687-4f45-9708-019B960494DF}">
-                <a14:hiddenLine xmlns:a14="http://schemas.microsoft.com/office/drawing/2010/main" xmlns="" w="9525">
+                <a14:hiddenLine xmlns="" xmlns:a14="http://schemas.microsoft.com/office/drawing/2010/main" w="9525">
                   <a:solidFill>
                     <a:srgbClr val="000000"/>
                   </a:solidFill>
@@ -2327,7 +2356,7 @@
             </a:ln>
             <a:extLst>
               <a:ext uri="{91240B29-F687-4f45-9708-019B960494DF}">
-                <a14:hiddenLine xmlns:a14="http://schemas.microsoft.com/office/drawing/2010/main" xmlns="" w="9525">
+                <a14:hiddenLine xmlns="" xmlns:a14="http://schemas.microsoft.com/office/drawing/2010/main" w="9525">
                   <a:solidFill>
                     <a:srgbClr val="000000"/>
                   </a:solidFill>
@@ -2361,7 +2390,7 @@
             </a:ln>
             <a:extLst>
               <a:ext uri="{91240B29-F687-4f45-9708-019B960494DF}">
-                <a14:hiddenLine xmlns:a14="http://schemas.microsoft.com/office/drawing/2010/main" xmlns="" w="9525">
+                <a14:hiddenLine xmlns="" xmlns:a14="http://schemas.microsoft.com/office/drawing/2010/main" w="9525">
                   <a:solidFill>
                     <a:srgbClr val="000000"/>
                   </a:solidFill>
@@ -2451,7 +2480,7 @@
             </a:ln>
             <a:extLst>
               <a:ext uri="{91240B29-F687-4f45-9708-019B960494DF}">
-                <a14:hiddenLine xmlns:a14="http://schemas.microsoft.com/office/drawing/2010/main" xmlns="" w="9525">
+                <a14:hiddenLine xmlns="" xmlns:a14="http://schemas.microsoft.com/office/drawing/2010/main" w="9525">
                   <a:solidFill>
                     <a:srgbClr val="000000"/>
                   </a:solidFill>
@@ -2513,7 +2542,7 @@
             </a:ln>
             <a:extLst>
               <a:ext uri="{91240B29-F687-4f45-9708-019B960494DF}">
-                <a14:hiddenLine xmlns:a14="http://schemas.microsoft.com/office/drawing/2010/main" xmlns="" w="9525">
+                <a14:hiddenLine xmlns="" xmlns:a14="http://schemas.microsoft.com/office/drawing/2010/main" w="9525">
                   <a:solidFill>
                     <a:srgbClr val="000000"/>
                   </a:solidFill>
@@ -2575,7 +2604,7 @@
             </a:ln>
             <a:extLst>
               <a:ext uri="{91240B29-F687-4f45-9708-019B960494DF}">
-                <a14:hiddenLine xmlns:a14="http://schemas.microsoft.com/office/drawing/2010/main" xmlns="" w="9525">
+                <a14:hiddenLine xmlns="" xmlns:a14="http://schemas.microsoft.com/office/drawing/2010/main" w="9525">
                   <a:solidFill>
                     <a:srgbClr val="000000"/>
                   </a:solidFill>
@@ -2665,7 +2694,7 @@
             </a:ln>
             <a:extLst>
               <a:ext uri="{91240B29-F687-4f45-9708-019B960494DF}">
-                <a14:hiddenLine xmlns:a14="http://schemas.microsoft.com/office/drawing/2010/main" xmlns="" w="9525">
+                <a14:hiddenLine xmlns="" xmlns:a14="http://schemas.microsoft.com/office/drawing/2010/main" w="9525">
                   <a:solidFill>
                     <a:srgbClr val="000000"/>
                   </a:solidFill>
@@ -2733,7 +2762,7 @@
             </a:ln>
             <a:extLst>
               <a:ext uri="{91240B29-F687-4f45-9708-019B960494DF}">
-                <a14:hiddenLine xmlns:a14="http://schemas.microsoft.com/office/drawing/2010/main" xmlns="" w="9525">
+                <a14:hiddenLine xmlns="" xmlns:a14="http://schemas.microsoft.com/office/drawing/2010/main" w="9525">
                   <a:solidFill>
                     <a:srgbClr val="000000"/>
                   </a:solidFill>
@@ -2795,7 +2824,7 @@
             </a:ln>
             <a:extLst>
               <a:ext uri="{91240B29-F687-4f45-9708-019B960494DF}">
-                <a14:hiddenLine xmlns:a14="http://schemas.microsoft.com/office/drawing/2010/main" xmlns="" w="9525">
+                <a14:hiddenLine xmlns="" xmlns:a14="http://schemas.microsoft.com/office/drawing/2010/main" w="9525">
                   <a:solidFill>
                     <a:srgbClr val="000000"/>
                   </a:solidFill>
@@ -2885,7 +2914,7 @@
             </a:ln>
             <a:extLst>
               <a:ext uri="{91240B29-F687-4f45-9708-019B960494DF}">
-                <a14:hiddenLine xmlns:a14="http://schemas.microsoft.com/office/drawing/2010/main" xmlns="" w="9525">
+                <a14:hiddenLine xmlns="" xmlns:a14="http://schemas.microsoft.com/office/drawing/2010/main" w="9525">
                   <a:solidFill>
                     <a:srgbClr val="000000"/>
                   </a:solidFill>
@@ -2947,7 +2976,7 @@
             </a:ln>
             <a:extLst>
               <a:ext uri="{91240B29-F687-4f45-9708-019B960494DF}">
-                <a14:hiddenLine xmlns:a14="http://schemas.microsoft.com/office/drawing/2010/main" xmlns="" w="9525">
+                <a14:hiddenLine xmlns="" xmlns:a14="http://schemas.microsoft.com/office/drawing/2010/main" w="9525">
                   <a:solidFill>
                     <a:srgbClr val="000000"/>
                   </a:solidFill>
@@ -3037,7 +3066,7 @@
             </a:ln>
             <a:extLst>
               <a:ext uri="{91240B29-F687-4f45-9708-019B960494DF}">
-                <a14:hiddenLine xmlns:a14="http://schemas.microsoft.com/office/drawing/2010/main" xmlns="" w="9525">
+                <a14:hiddenLine xmlns="" xmlns:a14="http://schemas.microsoft.com/office/drawing/2010/main" w="9525">
                   <a:solidFill>
                     <a:srgbClr val="000000"/>
                   </a:solidFill>
@@ -3099,7 +3128,7 @@
             </a:ln>
             <a:extLst>
               <a:ext uri="{91240B29-F687-4f45-9708-019B960494DF}">
-                <a14:hiddenLine xmlns:a14="http://schemas.microsoft.com/office/drawing/2010/main" xmlns="" w="9525">
+                <a14:hiddenLine xmlns="" xmlns:a14="http://schemas.microsoft.com/office/drawing/2010/main" w="9525">
                   <a:solidFill>
                     <a:srgbClr val="000000"/>
                   </a:solidFill>
@@ -3189,7 +3218,7 @@
             </a:ln>
             <a:extLst>
               <a:ext uri="{91240B29-F687-4f45-9708-019B960494DF}">
-                <a14:hiddenLine xmlns:a14="http://schemas.microsoft.com/office/drawing/2010/main" xmlns="" w="9525">
+                <a14:hiddenLine xmlns="" xmlns:a14="http://schemas.microsoft.com/office/drawing/2010/main" w="9525">
                   <a:solidFill>
                     <a:srgbClr val="000000"/>
                   </a:solidFill>
@@ -3223,7 +3252,7 @@
             </a:ln>
             <a:extLst>
               <a:ext uri="{91240B29-F687-4f45-9708-019B960494DF}">
-                <a14:hiddenLine xmlns:a14="http://schemas.microsoft.com/office/drawing/2010/main" xmlns="" w="9525">
+                <a14:hiddenLine xmlns="" xmlns:a14="http://schemas.microsoft.com/office/drawing/2010/main" w="9525">
                   <a:solidFill>
                     <a:srgbClr val="000000"/>
                   </a:solidFill>
@@ -3288,7 +3317,7 @@
             </a:ln>
             <a:extLst>
               <a:ext uri="{91240B29-F687-4f45-9708-019B960494DF}">
-                <a14:hiddenLine xmlns:a14="http://schemas.microsoft.com/office/drawing/2010/main" xmlns="" w="9525">
+                <a14:hiddenLine xmlns="" xmlns:a14="http://schemas.microsoft.com/office/drawing/2010/main" w="9525">
                   <a:solidFill>
                     <a:srgbClr val="000000"/>
                   </a:solidFill>
@@ -3378,7 +3407,7 @@
             </a:ln>
             <a:extLst>
               <a:ext uri="{91240B29-F687-4f45-9708-019B960494DF}">
-                <a14:hiddenLine xmlns:a14="http://schemas.microsoft.com/office/drawing/2010/main" xmlns="" w="9525">
+                <a14:hiddenLine xmlns="" xmlns:a14="http://schemas.microsoft.com/office/drawing/2010/main" w="9525">
                   <a:solidFill>
                     <a:srgbClr val="000000"/>
                   </a:solidFill>
@@ -3440,7 +3469,7 @@
             </a:ln>
             <a:extLst>
               <a:ext uri="{91240B29-F687-4f45-9708-019B960494DF}">
-                <a14:hiddenLine xmlns:a14="http://schemas.microsoft.com/office/drawing/2010/main" xmlns="" w="9525">
+                <a14:hiddenLine xmlns="" xmlns:a14="http://schemas.microsoft.com/office/drawing/2010/main" w="9525">
                   <a:solidFill>
                     <a:srgbClr val="000000"/>
                   </a:solidFill>
@@ -3530,7 +3559,7 @@
             </a:ln>
             <a:extLst>
               <a:ext uri="{91240B29-F687-4f45-9708-019B960494DF}">
-                <a14:hiddenLine xmlns:a14="http://schemas.microsoft.com/office/drawing/2010/main" xmlns="" w="9525">
+                <a14:hiddenLine xmlns="" xmlns:a14="http://schemas.microsoft.com/office/drawing/2010/main" w="9525">
                   <a:solidFill>
                     <a:srgbClr val="000000"/>
                   </a:solidFill>
@@ -3620,7 +3649,7 @@
             </a:ln>
             <a:extLst>
               <a:ext uri="{91240B29-F687-4f45-9708-019B960494DF}">
-                <a14:hiddenLine xmlns:a14="http://schemas.microsoft.com/office/drawing/2010/main" xmlns="" w="9525">
+                <a14:hiddenLine xmlns="" xmlns:a14="http://schemas.microsoft.com/office/drawing/2010/main" w="9525">
                   <a:solidFill>
                     <a:srgbClr val="000000"/>
                   </a:solidFill>
@@ -3685,7 +3714,7 @@
             </a:ln>
             <a:extLst>
               <a:ext uri="{91240B29-F687-4f45-9708-019B960494DF}">
-                <a14:hiddenLine xmlns:a14="http://schemas.microsoft.com/office/drawing/2010/main" xmlns="" w="9525">
+                <a14:hiddenLine xmlns="" xmlns:a14="http://schemas.microsoft.com/office/drawing/2010/main" w="9525">
                   <a:solidFill>
                     <a:srgbClr val="000000"/>
                   </a:solidFill>
@@ -3747,7 +3776,7 @@
             </a:ln>
             <a:extLst>
               <a:ext uri="{91240B29-F687-4f45-9708-019B960494DF}">
-                <a14:hiddenLine xmlns:a14="http://schemas.microsoft.com/office/drawing/2010/main" xmlns="" w="9525">
+                <a14:hiddenLine xmlns="" xmlns:a14="http://schemas.microsoft.com/office/drawing/2010/main" w="9525">
                   <a:solidFill>
                     <a:srgbClr val="000000"/>
                   </a:solidFill>
@@ -3837,7 +3866,7 @@
             </a:ln>
             <a:extLst>
               <a:ext uri="{91240B29-F687-4f45-9708-019B960494DF}">
-                <a14:hiddenLine xmlns:a14="http://schemas.microsoft.com/office/drawing/2010/main" xmlns="" w="9525">
+                <a14:hiddenLine xmlns="" xmlns:a14="http://schemas.microsoft.com/office/drawing/2010/main" w="9525">
                   <a:solidFill>
                     <a:srgbClr val="000000"/>
                   </a:solidFill>
@@ -3927,7 +3956,7 @@
             </a:ln>
             <a:extLst>
               <a:ext uri="{91240B29-F687-4f45-9708-019B960494DF}">
-                <a14:hiddenLine xmlns:a14="http://schemas.microsoft.com/office/drawing/2010/main" xmlns="" w="9525">
+                <a14:hiddenLine xmlns="" xmlns:a14="http://schemas.microsoft.com/office/drawing/2010/main" w="9525">
                   <a:solidFill>
                     <a:srgbClr val="000000"/>
                   </a:solidFill>
@@ -3989,7 +4018,7 @@
             </a:ln>
             <a:extLst>
               <a:ext uri="{91240B29-F687-4f45-9708-019B960494DF}">
-                <a14:hiddenLine xmlns:a14="http://schemas.microsoft.com/office/drawing/2010/main" xmlns="" w="9525">
+                <a14:hiddenLine xmlns="" xmlns:a14="http://schemas.microsoft.com/office/drawing/2010/main" w="9525">
                   <a:solidFill>
                     <a:srgbClr val="000000"/>
                   </a:solidFill>
@@ -4109,7 +4138,7 @@
             </a:ln>
             <a:extLst>
               <a:ext uri="{91240B29-F687-4f45-9708-019B960494DF}">
-                <a14:hiddenLine xmlns:a14="http://schemas.microsoft.com/office/drawing/2010/main" xmlns="" w="9525">
+                <a14:hiddenLine xmlns="" xmlns:a14="http://schemas.microsoft.com/office/drawing/2010/main" w="9525">
                   <a:solidFill>
                     <a:srgbClr val="000000"/>
                   </a:solidFill>
@@ -4177,7 +4206,7 @@
             </a:ln>
             <a:extLst>
               <a:ext uri="{91240B29-F687-4f45-9708-019B960494DF}">
-                <a14:hiddenLine xmlns:a14="http://schemas.microsoft.com/office/drawing/2010/main" xmlns="" w="9525">
+                <a14:hiddenLine xmlns="" xmlns:a14="http://schemas.microsoft.com/office/drawing/2010/main" w="9525">
                   <a:solidFill>
                     <a:srgbClr val="000000"/>
                   </a:solidFill>
@@ -4267,7 +4296,7 @@
             </a:ln>
             <a:extLst>
               <a:ext uri="{91240B29-F687-4f45-9708-019B960494DF}">
-                <a14:hiddenLine xmlns:a14="http://schemas.microsoft.com/office/drawing/2010/main" xmlns="" w="9525">
+                <a14:hiddenLine xmlns="" xmlns:a14="http://schemas.microsoft.com/office/drawing/2010/main" w="9525">
                   <a:solidFill>
                     <a:srgbClr val="000000"/>
                   </a:solidFill>
@@ -8959,7 +8988,7 @@
           <a:noFill/>
           <a:extLst>
             <a:ext uri="{909E8E84-426E-40dd-AFC4-6F175D3DCCD1}">
-              <a14:hiddenFill xmlns:a14="http://schemas.microsoft.com/office/drawing/2010/main" xmlns="">
+              <a14:hiddenFill xmlns="" xmlns:a14="http://schemas.microsoft.com/office/drawing/2010/main">
                 <a:solidFill>
                   <a:srgbClr val="FFFFFF"/>
                 </a:solidFill>
@@ -9033,7 +9062,7 @@
               </a:ln>
               <a:extLst>
                 <a:ext uri="{91240B29-F687-4f45-9708-019B960494DF}">
-                  <a14:hiddenLine xmlns:a14="http://schemas.microsoft.com/office/drawing/2010/main" xmlns="" w="9525">
+                  <a14:hiddenLine xmlns="" xmlns:a14="http://schemas.microsoft.com/office/drawing/2010/main" w="9525">
                     <a:solidFill>
                       <a:srgbClr val="000000"/>
                     </a:solidFill>
@@ -9123,7 +9152,7 @@
               </a:ln>
               <a:extLst>
                 <a:ext uri="{91240B29-F687-4f45-9708-019B960494DF}">
-                  <a14:hiddenLine xmlns:a14="http://schemas.microsoft.com/office/drawing/2010/main" xmlns="" w="9525">
+                  <a14:hiddenLine xmlns="" xmlns:a14="http://schemas.microsoft.com/office/drawing/2010/main" w="9525">
                     <a:solidFill>
                       <a:srgbClr val="000000"/>
                     </a:solidFill>
@@ -9213,7 +9242,7 @@
               </a:ln>
               <a:extLst>
                 <a:ext uri="{91240B29-F687-4f45-9708-019B960494DF}">
-                  <a14:hiddenLine xmlns:a14="http://schemas.microsoft.com/office/drawing/2010/main" xmlns="" w="9525">
+                  <a14:hiddenLine xmlns="" xmlns:a14="http://schemas.microsoft.com/office/drawing/2010/main" w="9525">
                     <a:solidFill>
                       <a:srgbClr val="000000"/>
                     </a:solidFill>
@@ -9275,7 +9304,7 @@
               </a:ln>
               <a:extLst>
                 <a:ext uri="{91240B29-F687-4f45-9708-019B960494DF}">
-                  <a14:hiddenLine xmlns:a14="http://schemas.microsoft.com/office/drawing/2010/main" xmlns="" w="9525">
+                  <a14:hiddenLine xmlns="" xmlns:a14="http://schemas.microsoft.com/office/drawing/2010/main" w="9525">
                     <a:solidFill>
                       <a:srgbClr val="000000"/>
                     </a:solidFill>
@@ -9365,7 +9394,7 @@
               </a:ln>
               <a:extLst>
                 <a:ext uri="{91240B29-F687-4f45-9708-019B960494DF}">
-                  <a14:hiddenLine xmlns:a14="http://schemas.microsoft.com/office/drawing/2010/main" xmlns="" w="9525">
+                  <a14:hiddenLine xmlns="" xmlns:a14="http://schemas.microsoft.com/office/drawing/2010/main" w="9525">
                     <a:solidFill>
                       <a:srgbClr val="000000"/>
                     </a:solidFill>
@@ -9427,7 +9456,7 @@
               </a:ln>
               <a:extLst>
                 <a:ext uri="{91240B29-F687-4f45-9708-019B960494DF}">
-                  <a14:hiddenLine xmlns:a14="http://schemas.microsoft.com/office/drawing/2010/main" xmlns="" w="9525">
+                  <a14:hiddenLine xmlns="" xmlns:a14="http://schemas.microsoft.com/office/drawing/2010/main" w="9525">
                     <a:solidFill>
                       <a:srgbClr val="000000"/>
                     </a:solidFill>
@@ -9489,7 +9518,7 @@
               </a:ln>
               <a:extLst>
                 <a:ext uri="{91240B29-F687-4f45-9708-019B960494DF}">
-                  <a14:hiddenLine xmlns:a14="http://schemas.microsoft.com/office/drawing/2010/main" xmlns="" w="9525">
+                  <a14:hiddenLine xmlns="" xmlns:a14="http://schemas.microsoft.com/office/drawing/2010/main" w="9525">
                     <a:solidFill>
                       <a:srgbClr val="000000"/>
                     </a:solidFill>
@@ -9579,7 +9608,7 @@
               </a:ln>
               <a:extLst>
                 <a:ext uri="{91240B29-F687-4f45-9708-019B960494DF}">
-                  <a14:hiddenLine xmlns:a14="http://schemas.microsoft.com/office/drawing/2010/main" xmlns="" w="9525">
+                  <a14:hiddenLine xmlns="" xmlns:a14="http://schemas.microsoft.com/office/drawing/2010/main" w="9525">
                     <a:solidFill>
                       <a:srgbClr val="000000"/>
                     </a:solidFill>
@@ -9669,7 +9698,7 @@
               </a:ln>
               <a:extLst>
                 <a:ext uri="{91240B29-F687-4f45-9708-019B960494DF}">
-                  <a14:hiddenLine xmlns:a14="http://schemas.microsoft.com/office/drawing/2010/main" xmlns="" w="9525">
+                  <a14:hiddenLine xmlns="" xmlns:a14="http://schemas.microsoft.com/office/drawing/2010/main" w="9525">
                     <a:solidFill>
                       <a:srgbClr val="000000"/>
                     </a:solidFill>
@@ -9731,7 +9760,7 @@
               </a:ln>
               <a:extLst>
                 <a:ext uri="{91240B29-F687-4f45-9708-019B960494DF}">
-                  <a14:hiddenLine xmlns:a14="http://schemas.microsoft.com/office/drawing/2010/main" xmlns="" w="9525">
+                  <a14:hiddenLine xmlns="" xmlns:a14="http://schemas.microsoft.com/office/drawing/2010/main" w="9525">
                     <a:solidFill>
                       <a:srgbClr val="000000"/>
                     </a:solidFill>
@@ -9841,7 +9870,7 @@
               </a:ln>
               <a:extLst>
                 <a:ext uri="{91240B29-F687-4f45-9708-019B960494DF}">
-                  <a14:hiddenLine xmlns:a14="http://schemas.microsoft.com/office/drawing/2010/main" xmlns="" w="9525">
+                  <a14:hiddenLine xmlns="" xmlns:a14="http://schemas.microsoft.com/office/drawing/2010/main" w="9525">
                     <a:solidFill>
                       <a:srgbClr val="000000"/>
                     </a:solidFill>
@@ -9925,7 +9954,7 @@
               </a:ln>
               <a:extLst>
                 <a:ext uri="{91240B29-F687-4f45-9708-019B960494DF}">
-                  <a14:hiddenLine xmlns:a14="http://schemas.microsoft.com/office/drawing/2010/main" xmlns="" w="9525">
+                  <a14:hiddenLine xmlns="" xmlns:a14="http://schemas.microsoft.com/office/drawing/2010/main" w="9525">
                     <a:solidFill>
                       <a:srgbClr val="000000"/>
                     </a:solidFill>
@@ -9987,7 +10016,7 @@
               </a:ln>
               <a:extLst>
                 <a:ext uri="{91240B29-F687-4f45-9708-019B960494DF}">
-                  <a14:hiddenLine xmlns:a14="http://schemas.microsoft.com/office/drawing/2010/main" xmlns="" w="9525">
+                  <a14:hiddenLine xmlns="" xmlns:a14="http://schemas.microsoft.com/office/drawing/2010/main" w="9525">
                     <a:solidFill>
                       <a:srgbClr val="000000"/>
                     </a:solidFill>
@@ -10049,7 +10078,7 @@
               </a:ln>
               <a:extLst>
                 <a:ext uri="{91240B29-F687-4f45-9708-019B960494DF}">
-                  <a14:hiddenLine xmlns:a14="http://schemas.microsoft.com/office/drawing/2010/main" xmlns="" w="9525">
+                  <a14:hiddenLine xmlns="" xmlns:a14="http://schemas.microsoft.com/office/drawing/2010/main" w="9525">
                     <a:solidFill>
                       <a:srgbClr val="000000"/>
                     </a:solidFill>
@@ -10139,7 +10168,7 @@
               </a:ln>
               <a:extLst>
                 <a:ext uri="{91240B29-F687-4f45-9708-019B960494DF}">
-                  <a14:hiddenLine xmlns:a14="http://schemas.microsoft.com/office/drawing/2010/main" xmlns="" w="9525">
+                  <a14:hiddenLine xmlns="" xmlns:a14="http://schemas.microsoft.com/office/drawing/2010/main" w="9525">
                     <a:solidFill>
                       <a:srgbClr val="000000"/>
                     </a:solidFill>
@@ -10173,7 +10202,7 @@
               </a:ln>
               <a:extLst>
                 <a:ext uri="{91240B29-F687-4f45-9708-019B960494DF}">
-                  <a14:hiddenLine xmlns:a14="http://schemas.microsoft.com/office/drawing/2010/main" xmlns="" w="9525">
+                  <a14:hiddenLine xmlns="" xmlns:a14="http://schemas.microsoft.com/office/drawing/2010/main" w="9525">
                     <a:solidFill>
                       <a:srgbClr val="000000"/>
                     </a:solidFill>
@@ -10238,7 +10267,7 @@
               </a:ln>
               <a:extLst>
                 <a:ext uri="{91240B29-F687-4f45-9708-019B960494DF}">
-                  <a14:hiddenLine xmlns:a14="http://schemas.microsoft.com/office/drawing/2010/main" xmlns="" w="9525">
+                  <a14:hiddenLine xmlns="" xmlns:a14="http://schemas.microsoft.com/office/drawing/2010/main" w="9525">
                     <a:solidFill>
                       <a:srgbClr val="000000"/>
                     </a:solidFill>
@@ -10328,7 +10357,7 @@
               </a:ln>
               <a:extLst>
                 <a:ext uri="{91240B29-F687-4f45-9708-019B960494DF}">
-                  <a14:hiddenLine xmlns:a14="http://schemas.microsoft.com/office/drawing/2010/main" xmlns="" w="9525">
+                  <a14:hiddenLine xmlns="" xmlns:a14="http://schemas.microsoft.com/office/drawing/2010/main" w="9525">
                     <a:solidFill>
                       <a:srgbClr val="000000"/>
                     </a:solidFill>
@@ -10390,7 +10419,7 @@
               </a:ln>
               <a:extLst>
                 <a:ext uri="{91240B29-F687-4f45-9708-019B960494DF}">
-                  <a14:hiddenLine xmlns:a14="http://schemas.microsoft.com/office/drawing/2010/main" xmlns="" w="9525">
+                  <a14:hiddenLine xmlns="" xmlns:a14="http://schemas.microsoft.com/office/drawing/2010/main" w="9525">
                     <a:solidFill>
                       <a:srgbClr val="000000"/>
                     </a:solidFill>
@@ -10480,7 +10509,7 @@
               </a:ln>
               <a:extLst>
                 <a:ext uri="{91240B29-F687-4f45-9708-019B960494DF}">
-                  <a14:hiddenLine xmlns:a14="http://schemas.microsoft.com/office/drawing/2010/main" xmlns="" w="9525">
+                  <a14:hiddenLine xmlns="" xmlns:a14="http://schemas.microsoft.com/office/drawing/2010/main" w="9525">
                     <a:solidFill>
                       <a:srgbClr val="000000"/>
                     </a:solidFill>
@@ -10545,7 +10574,7 @@
               </a:ln>
               <a:extLst>
                 <a:ext uri="{91240B29-F687-4f45-9708-019B960494DF}">
-                  <a14:hiddenLine xmlns:a14="http://schemas.microsoft.com/office/drawing/2010/main" xmlns="" w="9525">
+                  <a14:hiddenLine xmlns="" xmlns:a14="http://schemas.microsoft.com/office/drawing/2010/main" w="9525">
                     <a:solidFill>
                       <a:srgbClr val="000000"/>
                     </a:solidFill>
@@ -10607,7 +10636,7 @@
               </a:ln>
               <a:extLst>
                 <a:ext uri="{91240B29-F687-4f45-9708-019B960494DF}">
-                  <a14:hiddenLine xmlns:a14="http://schemas.microsoft.com/office/drawing/2010/main" xmlns="" w="9525">
+                  <a14:hiddenLine xmlns="" xmlns:a14="http://schemas.microsoft.com/office/drawing/2010/main" w="9525">
                     <a:solidFill>
                       <a:srgbClr val="000000"/>
                     </a:solidFill>
@@ -10697,7 +10726,7 @@
               </a:ln>
               <a:extLst>
                 <a:ext uri="{91240B29-F687-4f45-9708-019B960494DF}">
-                  <a14:hiddenLine xmlns:a14="http://schemas.microsoft.com/office/drawing/2010/main" xmlns="" w="9525">
+                  <a14:hiddenLine xmlns="" xmlns:a14="http://schemas.microsoft.com/office/drawing/2010/main" w="9525">
                     <a:solidFill>
                       <a:srgbClr val="000000"/>
                     </a:solidFill>
@@ -10787,7 +10816,7 @@
               </a:ln>
               <a:extLst>
                 <a:ext uri="{91240B29-F687-4f45-9708-019B960494DF}">
-                  <a14:hiddenLine xmlns:a14="http://schemas.microsoft.com/office/drawing/2010/main" xmlns="" w="9525">
+                  <a14:hiddenLine xmlns="" xmlns:a14="http://schemas.microsoft.com/office/drawing/2010/main" w="9525">
                     <a:solidFill>
                       <a:srgbClr val="000000"/>
                     </a:solidFill>
@@ -10852,7 +10881,7 @@
               </a:ln>
               <a:extLst>
                 <a:ext uri="{91240B29-F687-4f45-9708-019B960494DF}">
-                  <a14:hiddenLine xmlns:a14="http://schemas.microsoft.com/office/drawing/2010/main" xmlns="" w="9525">
+                  <a14:hiddenLine xmlns="" xmlns:a14="http://schemas.microsoft.com/office/drawing/2010/main" w="9525">
                     <a:solidFill>
                       <a:srgbClr val="000000"/>
                     </a:solidFill>
@@ -10972,7 +11001,7 @@
               </a:ln>
               <a:extLst>
                 <a:ext uri="{91240B29-F687-4f45-9708-019B960494DF}">
-                  <a14:hiddenLine xmlns:a14="http://schemas.microsoft.com/office/drawing/2010/main" xmlns="" w="9525">
+                  <a14:hiddenLine xmlns="" xmlns:a14="http://schemas.microsoft.com/office/drawing/2010/main" w="9525">
                     <a:solidFill>
                       <a:srgbClr val="000000"/>
                     </a:solidFill>
@@ -11070,7 +11099,7 @@
               </a:ln>
               <a:extLst>
                 <a:ext uri="{91240B29-F687-4f45-9708-019B960494DF}">
-                  <a14:hiddenLine xmlns:a14="http://schemas.microsoft.com/office/drawing/2010/main" xmlns="" w="9525">
+                  <a14:hiddenLine xmlns="" xmlns:a14="http://schemas.microsoft.com/office/drawing/2010/main" w="9525">
                     <a:solidFill>
                       <a:srgbClr val="000000"/>
                     </a:solidFill>
@@ -11185,7 +11214,7 @@
               </a:ln>
               <a:extLst>
                 <a:ext uri="{91240B29-F687-4f45-9708-019B960494DF}">
-                  <a14:hiddenLine xmlns:a14="http://schemas.microsoft.com/office/drawing/2010/main" xmlns="" w="9525">
+                  <a14:hiddenLine xmlns="" xmlns:a14="http://schemas.microsoft.com/office/drawing/2010/main" w="9525">
                     <a:solidFill>
                       <a:srgbClr val="000000"/>
                     </a:solidFill>
@@ -11275,7 +11304,7 @@
               </a:ln>
               <a:extLst>
                 <a:ext uri="{91240B29-F687-4f45-9708-019B960494DF}">
-                  <a14:hiddenLine xmlns:a14="http://schemas.microsoft.com/office/drawing/2010/main" xmlns="" w="9525">
+                  <a14:hiddenLine xmlns="" xmlns:a14="http://schemas.microsoft.com/office/drawing/2010/main" w="9525">
                     <a:solidFill>
                       <a:srgbClr val="000000"/>
                     </a:solidFill>
@@ -11340,7 +11369,7 @@
               </a:ln>
               <a:extLst>
                 <a:ext uri="{91240B29-F687-4f45-9708-019B960494DF}">
-                  <a14:hiddenLine xmlns:a14="http://schemas.microsoft.com/office/drawing/2010/main" xmlns="" w="9525">
+                  <a14:hiddenLine xmlns="" xmlns:a14="http://schemas.microsoft.com/office/drawing/2010/main" w="9525">
                     <a:solidFill>
                       <a:srgbClr val="000000"/>
                     </a:solidFill>
@@ -11430,7 +11459,7 @@
               </a:ln>
               <a:extLst>
                 <a:ext uri="{91240B29-F687-4f45-9708-019B960494DF}">
-                  <a14:hiddenLine xmlns:a14="http://schemas.microsoft.com/office/drawing/2010/main" xmlns="" w="9525">
+                  <a14:hiddenLine xmlns="" xmlns:a14="http://schemas.microsoft.com/office/drawing/2010/main" w="9525">
                     <a:solidFill>
                       <a:srgbClr val="000000"/>
                     </a:solidFill>
@@ -11498,7 +11527,7 @@
               </a:ln>
               <a:extLst>
                 <a:ext uri="{91240B29-F687-4f45-9708-019B960494DF}">
-                  <a14:hiddenLine xmlns:a14="http://schemas.microsoft.com/office/drawing/2010/main" xmlns="" w="9525">
+                  <a14:hiddenLine xmlns="" xmlns:a14="http://schemas.microsoft.com/office/drawing/2010/main" w="9525">
                     <a:solidFill>
                       <a:srgbClr val="000000"/>
                     </a:solidFill>
@@ -11588,7 +11617,7 @@
               </a:ln>
               <a:extLst>
                 <a:ext uri="{91240B29-F687-4f45-9708-019B960494DF}">
-                  <a14:hiddenLine xmlns:a14="http://schemas.microsoft.com/office/drawing/2010/main" xmlns="" w="9525">
+                  <a14:hiddenLine xmlns="" xmlns:a14="http://schemas.microsoft.com/office/drawing/2010/main" w="9525">
                     <a:solidFill>
                       <a:srgbClr val="000000"/>
                     </a:solidFill>
@@ -11656,7 +11685,7 @@
               </a:ln>
               <a:extLst>
                 <a:ext uri="{91240B29-F687-4f45-9708-019B960494DF}">
-                  <a14:hiddenLine xmlns:a14="http://schemas.microsoft.com/office/drawing/2010/main" xmlns="" w="9525">
+                  <a14:hiddenLine xmlns="" xmlns:a14="http://schemas.microsoft.com/office/drawing/2010/main" w="9525">
                     <a:solidFill>
                       <a:srgbClr val="000000"/>
                     </a:solidFill>
@@ -11746,7 +11775,7 @@
               </a:ln>
               <a:extLst>
                 <a:ext uri="{91240B29-F687-4f45-9708-019B960494DF}">
-                  <a14:hiddenLine xmlns:a14="http://schemas.microsoft.com/office/drawing/2010/main" xmlns="" w="9525">
+                  <a14:hiddenLine xmlns="" xmlns:a14="http://schemas.microsoft.com/office/drawing/2010/main" w="9525">
                     <a:solidFill>
                       <a:srgbClr val="000000"/>
                     </a:solidFill>
@@ -11780,7 +11809,7 @@
               </a:ln>
               <a:extLst>
                 <a:ext uri="{91240B29-F687-4f45-9708-019B960494DF}">
-                  <a14:hiddenLine xmlns:a14="http://schemas.microsoft.com/office/drawing/2010/main" xmlns="" w="9525">
+                  <a14:hiddenLine xmlns="" xmlns:a14="http://schemas.microsoft.com/office/drawing/2010/main" w="9525">
                     <a:solidFill>
                       <a:srgbClr val="000000"/>
                     </a:solidFill>
@@ -12421,24 +12450,24 @@
           <a:lstStyle/>
           <a:p>
             <a:r>
-              <a:rPr lang="en-GB"/>
+              <a:rPr lang="en-GB" dirty="0"/>
               <a:t>Object oriented design, how it helps, and how to use it.</a:t>
             </a:r>
           </a:p>
           <a:p>
-            <a:endParaRPr lang="en-GB"/>
+            <a:endParaRPr lang="en-GB" dirty="0"/>
           </a:p>
           <a:p>
             <a:pPr algn="ctr"/>
             <a:r>
-              <a:rPr lang="en-GB"/>
+              <a:rPr lang="en-GB" dirty="0"/>
               <a:t>Breakout example:</a:t>
             </a:r>
           </a:p>
           <a:p>
             <a:pPr algn="ctr"/>
             <a:r>
-              <a:rPr lang="en-GB" cap="none">
+              <a:rPr lang="en-GB" cap="none" dirty="0">
                 <a:solidFill>
                   <a:schemeClr val="bg2">
                     <a:lumMod val="60000"/>
@@ -12446,7 +12475,7 @@
                   </a:schemeClr>
                 </a:solidFill>
               </a:rPr>
-              <a:t>Https://github.Com/seanyoung247/breakout</a:t>
+              <a:t>https://github.com/seanyoung247/breakout</a:t>
             </a:r>
           </a:p>
         </p:txBody>

</xml_diff>